<commit_message>
Fix typo and add cheats used during the workshop
</commit_message>
<xml_diff>
--- a/presentation/Presentation.pptx
+++ b/presentation/Presentation.pptx
@@ -225,7 +225,7 @@
           <a:p>
             <a:fld id="{17F23661-E68F-432A-A181-BA9A618B9166}" type="datetimeFigureOut">
               <a:rPr lang="pt-PT" smtClean="0"/>
-              <a:t>22/05/22</a:t>
+              <a:t>23/05/22</a:t>
             </a:fld>
             <a:endParaRPr lang="pt-PT"/>
           </a:p>
@@ -10476,7 +10476,7 @@
             </a:r>
             <a:r>
               <a:rPr lang="en-GB" dirty="0" err="1"/>
-              <a:t>pymimifier</a:t>
+              <a:t>pyminifier</a:t>
             </a:r>
             <a:endParaRPr lang="en-GB" dirty="0"/>
           </a:p>
@@ -10546,7 +10546,7 @@
             </a:r>
             <a:r>
               <a:rPr lang="en-GB" dirty="0" err="1"/>
-              <a:t>Pymimifier</a:t>
+              <a:t>Pyminifier</a:t>
             </a:r>
             <a:endParaRPr lang="en-GB" dirty="0"/>
           </a:p>

</xml_diff>